<commit_message>
vault backup: 2024-10-13 14:00:57
</commit_message>
<xml_diff>
--- a/Master Thesis/student_session_2.pptx
+++ b/Master Thesis/student_session_2.pptx
@@ -223,7 +223,7 @@
           <a:p>
             <a:fld id="{70A31F67-F89B-48FB-87FF-B7792C433AD1}" type="datetimeFigureOut">
               <a:rPr lang="en-GB" smtClean="0"/>
-              <a:t>18/09/2024</a:t>
+              <a:t>26/09/2024</a:t>
             </a:fld>
             <a:endParaRPr lang="en-GB"/>
           </a:p>
@@ -811,7 +811,7 @@
           <a:p>
             <a:fld id="{1A5CEA65-CA87-4693-AD64-B641248A63E4}" type="datetime1">
               <a:rPr lang="en-GB" smtClean="0"/>
-              <a:t>18/09/2024</a:t>
+              <a:t>26/09/2024</a:t>
             </a:fld>
             <a:endParaRPr lang="en-GB"/>
           </a:p>
@@ -1014,7 +1014,7 @@
           <a:p>
             <a:fld id="{9F159545-A8A5-428A-91FA-5093C06746AF}" type="datetime1">
               <a:rPr lang="en-GB" smtClean="0"/>
-              <a:t>18/09/2024</a:t>
+              <a:t>26/09/2024</a:t>
             </a:fld>
             <a:endParaRPr lang="en-GB"/>
           </a:p>
@@ -1227,7 +1227,7 @@
           <a:p>
             <a:fld id="{ED53E6E4-C629-462E-81D1-056274C28ED0}" type="datetime1">
               <a:rPr lang="en-GB" smtClean="0"/>
-              <a:t>18/09/2024</a:t>
+              <a:t>26/09/2024</a:t>
             </a:fld>
             <a:endParaRPr lang="en-GB"/>
           </a:p>
@@ -1454,7 +1454,7 @@
           <a:p>
             <a:fld id="{A409CA08-C688-4736-B48D-54330E3B0660}" type="datetime1">
               <a:rPr lang="en-GB" smtClean="0"/>
-              <a:t>18/09/2024</a:t>
+              <a:t>26/09/2024</a:t>
             </a:fld>
             <a:endParaRPr lang="en-GB"/>
           </a:p>
@@ -1681,7 +1681,7 @@
           <a:p>
             <a:fld id="{F4867B41-5E9F-4C0F-BA2A-37429250636D}" type="datetime1">
               <a:rPr lang="en-GB" smtClean="0"/>
-              <a:t>18/09/2024</a:t>
+              <a:t>26/09/2024</a:t>
             </a:fld>
             <a:endParaRPr lang="en-GB"/>
           </a:p>
@@ -1960,7 +1960,7 @@
           <a:p>
             <a:fld id="{5C563A20-B42F-4C2E-90B1-14A7D87B5981}" type="datetime1">
               <a:rPr lang="en-GB" smtClean="0"/>
-              <a:t>18/09/2024</a:t>
+              <a:t>26/09/2024</a:t>
             </a:fld>
             <a:endParaRPr lang="en-GB"/>
           </a:p>
@@ -2231,7 +2231,7 @@
           <a:p>
             <a:fld id="{5D41D50B-F27A-4C86-9782-F41FE2AE4043}" type="datetime1">
               <a:rPr lang="en-GB" smtClean="0"/>
-              <a:t>18/09/2024</a:t>
+              <a:t>26/09/2024</a:t>
             </a:fld>
             <a:endParaRPr lang="en-GB"/>
           </a:p>
@@ -2649,7 +2649,7 @@
           <a:p>
             <a:fld id="{F0E7BFC0-989D-446A-9FE1-C53932F21212}" type="datetime1">
               <a:rPr lang="en-GB" smtClean="0"/>
-              <a:t>18/09/2024</a:t>
+              <a:t>26/09/2024</a:t>
             </a:fld>
             <a:endParaRPr lang="en-GB"/>
           </a:p>
@@ -2800,7 +2800,7 @@
           <a:p>
             <a:fld id="{1359AE2A-9A97-4C40-8EEA-A9C53DFD8526}" type="datetime1">
               <a:rPr lang="en-GB" smtClean="0"/>
-              <a:t>18/09/2024</a:t>
+              <a:t>26/09/2024</a:t>
             </a:fld>
             <a:endParaRPr lang="en-GB"/>
           </a:p>
@@ -2916,7 +2916,7 @@
           <a:p>
             <a:fld id="{8C8B52D2-6DFA-4E0F-A2B8-848C0FAA9C9F}" type="datetime1">
               <a:rPr lang="en-GB" smtClean="0"/>
-              <a:t>18/09/2024</a:t>
+              <a:t>26/09/2024</a:t>
             </a:fld>
             <a:endParaRPr lang="en-GB"/>
           </a:p>
@@ -3232,7 +3232,7 @@
           <a:p>
             <a:fld id="{DCF715E5-BF1F-4258-8E88-8A4949A28886}" type="datetime1">
               <a:rPr lang="en-GB" smtClean="0"/>
-              <a:t>18/09/2024</a:t>
+              <a:t>26/09/2024</a:t>
             </a:fld>
             <a:endParaRPr lang="en-GB"/>
           </a:p>
@@ -3524,7 +3524,7 @@
           <a:p>
             <a:fld id="{06F12117-8547-4983-A7CA-E72F4ABD5674}" type="datetime1">
               <a:rPr lang="en-GB" smtClean="0"/>
-              <a:t>18/09/2024</a:t>
+              <a:t>26/09/2024</a:t>
             </a:fld>
             <a:endParaRPr lang="en-GB"/>
           </a:p>
@@ -3770,7 +3770,7 @@
           <a:p>
             <a:fld id="{1F32B6FB-A508-46A1-A7E4-686C06B50510}" type="datetime1">
               <a:rPr lang="en-GB" smtClean="0"/>
-              <a:t>18/09/2024</a:t>
+              <a:t>26/09/2024</a:t>
             </a:fld>
             <a:endParaRPr lang="en-GB"/>
           </a:p>
@@ -4344,7 +4344,7 @@
           <a:p>
             <a:fld id="{68877C4E-3FF8-4D7B-9C77-296658F7CF32}" type="datetime1">
               <a:rPr lang="en-GB" smtClean="0"/>
-              <a:t>18/09/2024</a:t>
+              <a:t>26/09/2024</a:t>
             </a:fld>
             <a:endParaRPr lang="en-GB"/>
           </a:p>
@@ -6585,7 +6585,7 @@
                 <a:pPr lvl="1"/>
                 <a:r>
                   <a:rPr lang="en-GB" dirty="0"/>
-                  <a:t>Others can be derived analytically or tested</a:t>
+                  <a:t>Others can be derived analytically or tested practically</a:t>
                 </a:r>
               </a:p>
             </p:txBody>
@@ -7061,8 +7061,8 @@
           </a:p>
         </p:txBody>
       </p:sp>
-      <mc:AlternateContent xmlns:mc="http://schemas.openxmlformats.org/markup-compatibility/2006">
-        <mc:Choice xmlns:a14="http://schemas.microsoft.com/office/drawing/2010/main" Requires="a14">
+      <mc:AlternateContent xmlns:mc="http://schemas.openxmlformats.org/markup-compatibility/2006" xmlns:a14="http://schemas.microsoft.com/office/drawing/2010/main">
+        <mc:Choice Requires="a14">
           <p:sp>
             <p:nvSpPr>
               <p:cNvPr id="7" name="TextBox 6">
@@ -7226,7 +7226,7 @@
             </p:txBody>
           </p:sp>
         </mc:Choice>
-        <mc:Fallback>
+        <mc:Fallback xmlns="">
           <p:sp>
             <p:nvSpPr>
               <p:cNvPr id="7" name="TextBox 6">
@@ -7388,18 +7388,38 @@
           </a:xfrm>
         </p:spPr>
         <p:txBody>
-          <a:bodyPr/>
+          <a:bodyPr>
+            <a:normAutofit/>
+          </a:bodyPr>
           <a:lstStyle/>
           <a:p>
             <a:r>
               <a:rPr lang="en-GB" dirty="0"/>
-              <a:t>Trained using T5-small</a:t>
-            </a:r>
-          </a:p>
-          <a:p>
+              <a:t>Trained using </a:t>
+            </a:r>
+            <a:r>
+              <a:rPr lang="en-GB" b="1" dirty="0"/>
+              <a:t>T5-small</a:t>
+            </a:r>
+          </a:p>
+          <a:p>
+            <a:r>
+              <a:rPr lang="en-GB" b="1" dirty="0"/>
+              <a:t>Metrics:</a:t>
+            </a:r>
+          </a:p>
+          <a:p>
+            <a:pPr lvl="1"/>
             <a:r>
               <a:rPr lang="en-GB" dirty="0"/>
               <a:t>NLL – likelihood of generated data</a:t>
+            </a:r>
+          </a:p>
+          <a:p>
+            <a:pPr lvl="1"/>
+            <a:r>
+              <a:rPr lang="en-GB" dirty="0"/>
+              <a:t>Perplexity – how well model understands language</a:t>
             </a:r>
           </a:p>
           <a:p>
@@ -7715,26 +7735,39 @@
                                   </p:childTnLst>
                                 </p:cTn>
                               </p:par>
-                            </p:childTnLst>
-                          </p:cTn>
-                        </p:par>
-                      </p:childTnLst>
-                    </p:cTn>
-                  </p:par>
-                  <p:par>
-                    <p:cTn id="11" fill="hold">
-                      <p:stCondLst>
-                        <p:cond delay="indefinite"/>
-                      </p:stCondLst>
-                      <p:childTnLst>
-                        <p:par>
-                          <p:cTn id="12" fill="hold">
-                            <p:stCondLst>
-                              <p:cond delay="0"/>
-                            </p:stCondLst>
-                            <p:childTnLst>
                               <p:par>
-                                <p:cTn id="13" presetID="1" presetClass="entr" presetSubtype="0" fill="hold" grpId="0" nodeType="clickEffect">
+                                <p:cTn id="11" presetID="1" presetClass="entr" presetSubtype="0" fill="hold" grpId="0" nodeType="withEffect">
+                                  <p:stCondLst>
+                                    <p:cond delay="0"/>
+                                  </p:stCondLst>
+                                  <p:childTnLst>
+                                    <p:set>
+                                      <p:cBhvr>
+                                        <p:cTn id="12" dur="1" fill="hold">
+                                          <p:stCondLst>
+                                            <p:cond delay="0"/>
+                                          </p:stCondLst>
+                                        </p:cTn>
+                                        <p:tgtEl>
+                                          <p:spTgt spid="3">
+                                            <p:txEl>
+                                              <p:pRg st="2" end="2"/>
+                                            </p:txEl>
+                                          </p:spTgt>
+                                        </p:tgtEl>
+                                        <p:attrNameLst>
+                                          <p:attrName>style.visibility</p:attrName>
+                                        </p:attrNameLst>
+                                      </p:cBhvr>
+                                      <p:to>
+                                        <p:strVal val="visible"/>
+                                      </p:to>
+                                    </p:set>
+                                  </p:childTnLst>
+                                </p:cTn>
+                              </p:par>
+                              <p:par>
+                                <p:cTn id="13" presetID="1" presetClass="entr" presetSubtype="0" fill="hold" grpId="0" nodeType="withEffect">
                                   <p:stCondLst>
                                     <p:cond delay="0"/>
                                   </p:stCondLst>
@@ -7749,7 +7782,7 @@
                                         <p:tgtEl>
                                           <p:spTgt spid="3">
                                             <p:txEl>
-                                              <p:pRg st="2" end="2"/>
+                                              <p:pRg st="3" end="3"/>
                                             </p:txEl>
                                           </p:spTgt>
                                         </p:tgtEl>
@@ -7798,7 +7831,7 @@
                                         <p:tgtEl>
                                           <p:spTgt spid="3">
                                             <p:txEl>
-                                              <p:pRg st="3" end="3"/>
+                                              <p:pRg st="4" end="4"/>
                                             </p:txEl>
                                           </p:spTgt>
                                         </p:tgtEl>
@@ -7847,7 +7880,56 @@
                                         <p:tgtEl>
                                           <p:spTgt spid="3">
                                             <p:txEl>
-                                              <p:pRg st="4" end="4"/>
+                                              <p:pRg st="5" end="5"/>
+                                            </p:txEl>
+                                          </p:spTgt>
+                                        </p:tgtEl>
+                                        <p:attrNameLst>
+                                          <p:attrName>style.visibility</p:attrName>
+                                        </p:attrNameLst>
+                                      </p:cBhvr>
+                                      <p:to>
+                                        <p:strVal val="visible"/>
+                                      </p:to>
+                                    </p:set>
+                                  </p:childTnLst>
+                                </p:cTn>
+                              </p:par>
+                            </p:childTnLst>
+                          </p:cTn>
+                        </p:par>
+                      </p:childTnLst>
+                    </p:cTn>
+                  </p:par>
+                  <p:par>
+                    <p:cTn id="23" fill="hold">
+                      <p:stCondLst>
+                        <p:cond delay="indefinite"/>
+                      </p:stCondLst>
+                      <p:childTnLst>
+                        <p:par>
+                          <p:cTn id="24" fill="hold">
+                            <p:stCondLst>
+                              <p:cond delay="0"/>
+                            </p:stCondLst>
+                            <p:childTnLst>
+                              <p:par>
+                                <p:cTn id="25" presetID="1" presetClass="entr" presetSubtype="0" fill="hold" grpId="0" nodeType="clickEffect">
+                                  <p:stCondLst>
+                                    <p:cond delay="0"/>
+                                  </p:stCondLst>
+                                  <p:childTnLst>
+                                    <p:set>
+                                      <p:cBhvr>
+                                        <p:cTn id="26" dur="1" fill="hold">
+                                          <p:stCondLst>
+                                            <p:cond delay="0"/>
+                                          </p:stCondLst>
+                                        </p:cTn>
+                                        <p:tgtEl>
+                                          <p:spTgt spid="3">
+                                            <p:txEl>
+                                              <p:pRg st="6" end="6"/>
                                             </p:txEl>
                                           </p:spTgt>
                                         </p:tgtEl>
@@ -7863,14 +7945,14 @@
                                 </p:cTn>
                               </p:par>
                               <p:par>
-                                <p:cTn id="23" presetID="1" presetClass="entr" presetSubtype="0" fill="hold" grpId="0" nodeType="withEffect">
+                                <p:cTn id="27" presetID="1" presetClass="entr" presetSubtype="0" fill="hold" grpId="0" nodeType="withEffect">
                                   <p:stCondLst>
                                     <p:cond delay="0"/>
                                   </p:stCondLst>
                                   <p:childTnLst>
                                     <p:set>
                                       <p:cBhvr>
-                                        <p:cTn id="24" dur="1" fill="hold">
+                                        <p:cTn id="28" dur="1" fill="hold">
                                           <p:stCondLst>
                                             <p:cond delay="0"/>
                                           </p:stCondLst>
@@ -7878,7 +7960,7 @@
                                         <p:tgtEl>
                                           <p:spTgt spid="3">
                                             <p:txEl>
-                                              <p:pRg st="5" end="5"/>
+                                              <p:pRg st="7" end="7"/>
                                             </p:txEl>
                                           </p:spTgt>
                                         </p:tgtEl>
@@ -7894,14 +7976,14 @@
                                 </p:cTn>
                               </p:par>
                               <p:par>
-                                <p:cTn id="25" presetID="1" presetClass="entr" presetSubtype="0" fill="hold" grpId="0" nodeType="withEffect">
+                                <p:cTn id="29" presetID="1" presetClass="entr" presetSubtype="0" fill="hold" grpId="0" nodeType="withEffect">
                                   <p:stCondLst>
                                     <p:cond delay="0"/>
                                   </p:stCondLst>
                                   <p:childTnLst>
                                     <p:set>
                                       <p:cBhvr>
-                                        <p:cTn id="26" dur="1" fill="hold">
+                                        <p:cTn id="30" dur="1" fill="hold">
                                           <p:stCondLst>
                                             <p:cond delay="0"/>
                                           </p:stCondLst>
@@ -7909,7 +7991,7 @@
                                         <p:tgtEl>
                                           <p:spTgt spid="3">
                                             <p:txEl>
-                                              <p:pRg st="6" end="6"/>
+                                              <p:pRg st="8" end="8"/>
                                             </p:txEl>
                                           </p:spTgt>
                                         </p:tgtEl>
@@ -8093,8 +8175,11 @@
           <a:p>
             <a:r>
               <a:rPr lang="en-GB" dirty="0"/>
-              <a:t>DDPM still outperforms D3PM</a:t>
-            </a:r>
+              <a:t>D3PM outperforms original DDPM on IS and NLL</a:t>
+            </a:r>
+          </a:p>
+          <a:p>
+            <a:endParaRPr lang="en-GB" dirty="0"/>
           </a:p>
           <a:p>
             <a:endParaRPr lang="en-GB" dirty="0"/>
@@ -8776,6 +8861,11 @@
               <a:rPr lang="en-GB" b="1" dirty="0"/>
               <a:t>competitive results</a:t>
             </a:r>
+            <a:r>
+              <a:rPr lang="en-GB" dirty="0"/>
+              <a:t> </a:t>
+            </a:r>
+            <a:endParaRPr lang="en-GB" b="1" dirty="0"/>
           </a:p>
           <a:p>
             <a:r>
@@ -8803,6 +8893,13 @@
             <a:r>
               <a:rPr lang="en-GB" dirty="0"/>
               <a:t>More structured transition matrices</a:t>
+            </a:r>
+          </a:p>
+          <a:p>
+            <a:pPr lvl="1"/>
+            <a:r>
+              <a:rPr lang="en-GB" dirty="0"/>
+              <a:t>Better noise schedules</a:t>
             </a:r>
           </a:p>
           <a:p>
@@ -9099,6 +9196,37 @@
                                   </p:childTnLst>
                                 </p:cTn>
                               </p:par>
+                              <p:par>
+                                <p:cTn id="21" presetID="1" presetClass="entr" presetSubtype="0" fill="hold" grpId="0" nodeType="withEffect">
+                                  <p:stCondLst>
+                                    <p:cond delay="0"/>
+                                  </p:stCondLst>
+                                  <p:childTnLst>
+                                    <p:set>
+                                      <p:cBhvr>
+                                        <p:cTn id="22" dur="1" fill="hold">
+                                          <p:stCondLst>
+                                            <p:cond delay="0"/>
+                                          </p:stCondLst>
+                                        </p:cTn>
+                                        <p:tgtEl>
+                                          <p:spTgt spid="4">
+                                            <p:txEl>
+                                              <p:pRg st="6" end="6"/>
+                                            </p:txEl>
+                                          </p:spTgt>
+                                        </p:tgtEl>
+                                        <p:attrNameLst>
+                                          <p:attrName>style.visibility</p:attrName>
+                                        </p:attrNameLst>
+                                      </p:cBhvr>
+                                      <p:to>
+                                        <p:strVal val="visible"/>
+                                      </p:to>
+                                    </p:set>
+                                  </p:childTnLst>
+                                </p:cTn>
+                              </p:par>
                             </p:childTnLst>
                           </p:cTn>
                         </p:par>
@@ -9470,8 +9598,12 @@
           <a:lstStyle/>
           <a:p>
             <a:r>
+              <a:rPr lang="en-GB" dirty="0"/>
+              <a:t>Generate </a:t>
+            </a:r>
+            <a:r>
               <a:rPr lang="en-GB" b="1" dirty="0"/>
-              <a:t>Novel outputs </a:t>
+              <a:t>novel outputs </a:t>
             </a:r>
             <a:r>
               <a:rPr lang="en-GB" dirty="0"/>
@@ -10506,8 +10638,8 @@
           </a:prstGeom>
         </p:spPr>
       </p:pic>
-      <mc:AlternateContent xmlns:mc="http://schemas.openxmlformats.org/markup-compatibility/2006">
-        <mc:Choice xmlns:a14="http://schemas.microsoft.com/office/drawing/2010/main" Requires="a14">
+      <mc:AlternateContent xmlns:mc="http://schemas.openxmlformats.org/markup-compatibility/2006" xmlns:a14="http://schemas.microsoft.com/office/drawing/2010/main">
+        <mc:Choice Requires="a14">
           <p:sp>
             <p:nvSpPr>
               <p:cNvPr id="12" name="Content Placeholder 11">
@@ -10591,7 +10723,7 @@
             </p:txBody>
           </p:sp>
         </mc:Choice>
-        <mc:Fallback>
+        <mc:Fallback xmlns="">
           <p:sp>
             <p:nvSpPr>
               <p:cNvPr id="12" name="Content Placeholder 11">
@@ -11014,7 +11146,9 @@
             </p:nvSpPr>
             <p:spPr/>
             <p:txBody>
-              <a:bodyPr/>
+              <a:bodyPr>
+                <a:normAutofit lnSpcReduction="10000"/>
+              </a:bodyPr>
               <a:lstStyle/>
               <a:p>
                 <a:r>
@@ -11334,8 +11468,27 @@
               </a:p>
               <a:p>
                 <a:r>
+                  <a:rPr lang="en-GB" b="1" dirty="0"/>
+                  <a:t>Loss</a:t>
+                </a:r>
+                <a:r>
                   <a:rPr lang="en-GB" dirty="0"/>
-                  <a:t>Loss is the KL-divergence between predicted and true posteriors</a:t>
+                  <a:t> is the variational </a:t>
+                </a:r>
+                <a:r>
+                  <a:rPr lang="en-GB" dirty="0" err="1"/>
+                  <a:t>upperbound</a:t>
+                </a:r>
+                <a:r>
+                  <a:rPr lang="en-GB" dirty="0"/>
+                  <a:t> on the negative-log-likelihood (NLL)</a:t>
+                </a:r>
+              </a:p>
+              <a:p>
+                <a:pPr lvl="1"/>
+                <a:r>
+                  <a:rPr lang="en-GB" dirty="0"/>
+                  <a:t>KL-divergence between predicted and true posteriors for each timestep</a:t>
                 </a:r>
               </a:p>
               <a:p>
@@ -11655,7 +11808,7 @@
               <a:blipFill>
                 <a:blip r:embed="rId2"/>
                 <a:stretch>
-                  <a:fillRect l="-522" t="-1261" r="-290"/>
+                  <a:fillRect l="-522" t="-1961" r="-290"/>
                 </a:stretch>
               </a:blipFill>
             </p:spPr>
@@ -11973,33 +12126,15 @@
                                   </p:childTnLst>
                                 </p:cTn>
                               </p:par>
-                            </p:childTnLst>
-                          </p:cTn>
-                        </p:par>
-                      </p:childTnLst>
-                    </p:cTn>
-                  </p:par>
-                  <p:par>
-                    <p:cTn id="23" fill="hold">
-                      <p:stCondLst>
-                        <p:cond delay="indefinite"/>
-                      </p:stCondLst>
-                      <p:childTnLst>
-                        <p:par>
-                          <p:cTn id="24" fill="hold">
-                            <p:stCondLst>
-                              <p:cond delay="0"/>
-                            </p:stCondLst>
-                            <p:childTnLst>
                               <p:par>
-                                <p:cTn id="25" presetID="1" presetClass="entr" presetSubtype="0" fill="hold" grpId="0" nodeType="clickEffect">
+                                <p:cTn id="23" presetID="1" presetClass="entr" presetSubtype="0" fill="hold" grpId="0" nodeType="withEffect">
                                   <p:stCondLst>
                                     <p:cond delay="0"/>
                                   </p:stCondLst>
                                   <p:childTnLst>
                                     <p:set>
                                       <p:cBhvr>
-                                        <p:cTn id="26" dur="1" fill="hold">
+                                        <p:cTn id="24" dur="1" fill="hold">
                                           <p:stCondLst>
                                             <p:cond delay="0"/>
                                           </p:stCondLst>
@@ -12022,8 +12157,26 @@
                                   </p:childTnLst>
                                 </p:cTn>
                               </p:par>
+                            </p:childTnLst>
+                          </p:cTn>
+                        </p:par>
+                      </p:childTnLst>
+                    </p:cTn>
+                  </p:par>
+                  <p:par>
+                    <p:cTn id="25" fill="hold">
+                      <p:stCondLst>
+                        <p:cond delay="indefinite"/>
+                      </p:stCondLst>
+                      <p:childTnLst>
+                        <p:par>
+                          <p:cTn id="26" fill="hold">
+                            <p:stCondLst>
+                              <p:cond delay="0"/>
+                            </p:stCondLst>
+                            <p:childTnLst>
                               <p:par>
-                                <p:cTn id="27" presetID="1" presetClass="entr" presetSubtype="0" fill="hold" grpId="0" nodeType="withEffect">
+                                <p:cTn id="27" presetID="1" presetClass="entr" presetSubtype="0" fill="hold" grpId="0" nodeType="clickEffect">
                                   <p:stCondLst>
                                     <p:cond delay="0"/>
                                   </p:stCondLst>
@@ -12101,6 +12254,37 @@
                                           <p:spTgt spid="3">
                                             <p:txEl>
                                               <p:pRg st="9" end="9"/>
+                                            </p:txEl>
+                                          </p:spTgt>
+                                        </p:tgtEl>
+                                        <p:attrNameLst>
+                                          <p:attrName>style.visibility</p:attrName>
+                                        </p:attrNameLst>
+                                      </p:cBhvr>
+                                      <p:to>
+                                        <p:strVal val="visible"/>
+                                      </p:to>
+                                    </p:set>
+                                  </p:childTnLst>
+                                </p:cTn>
+                              </p:par>
+                              <p:par>
+                                <p:cTn id="33" presetID="1" presetClass="entr" presetSubtype="0" fill="hold" grpId="0" nodeType="withEffect">
+                                  <p:stCondLst>
+                                    <p:cond delay="0"/>
+                                  </p:stCondLst>
+                                  <p:childTnLst>
+                                    <p:set>
+                                      <p:cBhvr>
+                                        <p:cTn id="34" dur="1" fill="hold">
+                                          <p:stCondLst>
+                                            <p:cond delay="0"/>
+                                          </p:stCondLst>
+                                        </p:cTn>
+                                        <p:tgtEl>
+                                          <p:spTgt spid="3">
+                                            <p:txEl>
+                                              <p:pRg st="10" end="10"/>
                                             </p:txEl>
                                           </p:spTgt>
                                         </p:tgtEl>
@@ -12747,7 +12931,7 @@
         </p:nvSpPr>
         <p:spPr>
           <a:xfrm>
-            <a:off x="2013668" y="4613090"/>
+            <a:off x="2128264" y="4614298"/>
             <a:ext cx="409112" cy="489527"/>
           </a:xfrm>
           <a:prstGeom prst="mathMultiply">
@@ -13484,8 +13668,8 @@
           </a:p>
         </p:txBody>
       </p:sp>
-      <mc:AlternateContent xmlns:mc="http://schemas.openxmlformats.org/markup-compatibility/2006">
-        <mc:Choice xmlns:a14="http://schemas.microsoft.com/office/drawing/2010/main" Requires="a14">
+      <mc:AlternateContent xmlns:mc="http://schemas.openxmlformats.org/markup-compatibility/2006" xmlns:a14="http://schemas.microsoft.com/office/drawing/2010/main">
+        <mc:Choice Requires="a14">
           <p:sp>
             <p:nvSpPr>
               <p:cNvPr id="3" name="Content Placeholder 2">
@@ -13641,7 +13825,7 @@
             </p:txBody>
           </p:sp>
         </mc:Choice>
-        <mc:Fallback>
+        <mc:Fallback xmlns="">
           <p:sp>
             <p:nvSpPr>
               <p:cNvPr id="3" name="Content Placeholder 2">
@@ -14192,8 +14376,8 @@
           </a:p>
         </p:txBody>
       </p:sp>
-      <mc:AlternateContent xmlns:mc="http://schemas.openxmlformats.org/markup-compatibility/2006">
-        <mc:Choice xmlns:a14="http://schemas.microsoft.com/office/drawing/2010/main" Requires="a14">
+      <mc:AlternateContent xmlns:mc="http://schemas.openxmlformats.org/markup-compatibility/2006" xmlns:a14="http://schemas.microsoft.com/office/drawing/2010/main">
+        <mc:Choice Requires="a14">
           <p:sp>
             <p:nvSpPr>
               <p:cNvPr id="3" name="Content Placeholder 2">
@@ -14372,7 +14556,7 @@
             </p:txBody>
           </p:sp>
         </mc:Choice>
-        <mc:Fallback>
+        <mc:Fallback xmlns="">
           <p:sp>
             <p:nvSpPr>
               <p:cNvPr id="3" name="Content Placeholder 2">
@@ -16011,20 +16195,20 @@
 </file>
 
 <file path=customXml/item1.xml><?xml version="1.0" encoding="utf-8"?>
-<p:properties xmlns:p="http://schemas.microsoft.com/office/2006/metadata/properties" xmlns:xsi="http://www.w3.org/2001/XMLSchema-instance" xmlns:pc="http://schemas.microsoft.com/office/infopath/2007/PartnerControls">
-  <documentManagement>
-    <_activity xmlns="32f5fda4-97a3-47c7-8308-3025c576a379" xsi:nil="true"/>
-  </documentManagement>
-</p:properties>
-</file>
-
-<file path=customXml/item2.xml><?xml version="1.0" encoding="utf-8"?>
 <?mso-contentType ?>
 <FormTemplates xmlns="http://schemas.microsoft.com/sharepoint/v3/contenttype/forms">
   <Display>DocumentLibraryForm</Display>
   <Edit>DocumentLibraryForm</Edit>
   <New>DocumentLibraryForm</New>
 </FormTemplates>
+</file>
+
+<file path=customXml/item2.xml><?xml version="1.0" encoding="utf-8"?>
+<p:properties xmlns:p="http://schemas.microsoft.com/office/2006/metadata/properties" xmlns:xsi="http://www.w3.org/2001/XMLSchema-instance" xmlns:pc="http://schemas.microsoft.com/office/infopath/2007/PartnerControls">
+  <documentManagement>
+    <_activity xmlns="32f5fda4-97a3-47c7-8308-3025c576a379" xsi:nil="true"/>
+  </documentManagement>
+</p:properties>
 </file>
 
 <file path=customXml/item3.xml><?xml version="1.0" encoding="utf-8"?>
@@ -16211,6 +16395,14 @@
 </file>
 
 <file path=customXml/itemProps1.xml><?xml version="1.0" encoding="utf-8"?>
+<ds:datastoreItem xmlns:ds="http://schemas.openxmlformats.org/officeDocument/2006/customXml" ds:itemID="{3BAD3C87-809D-469E-94DC-F31AF2A74861}">
+  <ds:schemaRefs>
+    <ds:schemaRef ds:uri="http://schemas.microsoft.com/sharepoint/v3/contenttype/forms"/>
+  </ds:schemaRefs>
+</ds:datastoreItem>
+</file>
+
+<file path=customXml/itemProps2.xml><?xml version="1.0" encoding="utf-8"?>
 <ds:datastoreItem xmlns:ds="http://schemas.openxmlformats.org/officeDocument/2006/customXml" ds:itemID="{DAB5AE8F-7517-4870-92E5-CACED0F47D85}">
   <ds:schemaRefs>
     <ds:schemaRef ds:uri="http://schemas.openxmlformats.org/package/2006/metadata/core-properties"/>
@@ -16223,14 +16415,6 @@
     <ds:schemaRef ds:uri="http://purl.org/dc/terms/"/>
     <ds:schemaRef ds:uri="32f5fda4-97a3-47c7-8308-3025c576a379"/>
     <ds:schemaRef ds:uri="http://www.w3.org/XML/1998/namespace"/>
-  </ds:schemaRefs>
-</ds:datastoreItem>
-</file>
-
-<file path=customXml/itemProps2.xml><?xml version="1.0" encoding="utf-8"?>
-<ds:datastoreItem xmlns:ds="http://schemas.openxmlformats.org/officeDocument/2006/customXml" ds:itemID="{3BAD3C87-809D-469E-94DC-F31AF2A74861}">
-  <ds:schemaRefs>
-    <ds:schemaRef ds:uri="http://schemas.microsoft.com/sharepoint/v3/contenttype/forms"/>
   </ds:schemaRefs>
 </ds:datastoreItem>
 </file>

</xml_diff>